<commit_message>
Update version of ppt
</commit_message>
<xml_diff>
--- a/Project/Final_DATABASE/Game_Database_Project.pptx
+++ b/Project/Final_DATABASE/Game_Database_Project.pptx
@@ -115,6 +115,11 @@
       </a:defRPr>
     </a:lvl9pPr>
   </p:defaultTextStyle>
+  <p:extLst>
+    <p:ext uri="{EFAFB233-063F-42B5-8137-9DF3F51BA10A}">
+      <p15:sldGuideLst xmlns:p15="http://schemas.microsoft.com/office/powerpoint/2012/main"/>
+    </p:ext>
+  </p:extLst>
 </p:presentation>
 </file>
 
@@ -7725,7 +7730,15 @@
           <a:p>
             <a:r>
               <a:rPr lang="en-US" sz="2400" dirty="0"/>
-              <a:t>Group 8</a:t>
+              <a:t>Team name: </a:t>
+            </a:r>
+            <a:r>
+              <a:rPr lang="en-US" sz="2400" dirty="0" err="1"/>
+              <a:t>Gamerpedia</a:t>
+            </a:r>
+            <a:r>
+              <a:rPr lang="en-US" sz="2400" dirty="0"/>
+              <a:t> Group 8</a:t>
             </a:r>
           </a:p>
           <a:p>
@@ -7761,6 +7774,36 @@
           </a:p>
         </p:txBody>
       </p:sp>
+      <p:pic>
+        <p:nvPicPr>
+          <p:cNvPr id="5" name="Picture 4">
+            <a:extLst>
+              <a:ext uri="{FF2B5EF4-FFF2-40B4-BE49-F238E27FC236}">
+                <a16:creationId xmlns:a16="http://schemas.microsoft.com/office/drawing/2014/main" id="{4BEE8484-576A-44D9-A911-1CDCE28F76D7}"/>
+              </a:ext>
+            </a:extLst>
+          </p:cNvPr>
+          <p:cNvPicPr>
+            <a:picLocks noChangeAspect="1"/>
+          </p:cNvPicPr>
+          <p:nvPr/>
+        </p:nvPicPr>
+        <p:blipFill>
+          <a:blip r:embed="rId2"/>
+          <a:stretch>
+            <a:fillRect/>
+          </a:stretch>
+        </p:blipFill>
+        <p:spPr>
+          <a:xfrm>
+            <a:off x="915100" y="4500191"/>
+            <a:ext cx="2543175" cy="1800225"/>
+          </a:xfrm>
+          <a:prstGeom prst="rect">
+            <a:avLst/>
+          </a:prstGeom>
+        </p:spPr>
+      </p:pic>
     </p:spTree>
     <p:extLst>
       <p:ext uri="{BB962C8B-B14F-4D97-AF65-F5344CB8AC3E}">
@@ -8188,13 +8231,13 @@
           <a:p>
             <a:r>
               <a:rPr lang="en-US" dirty="0"/>
-              <a:t>In the future, we wanted a web app that made the database look prettier </a:t>
+              <a:t>In the future, we wanted a web app that made the database look more professional </a:t>
             </a:r>
           </a:p>
           <a:p>
             <a:r>
               <a:rPr lang="en-US" dirty="0"/>
-              <a:t>This would include a small subscription – directed towards the upkeep of the database. </a:t>
+              <a:t>This would include a small subscription – directed towards the premium of the database. </a:t>
             </a:r>
           </a:p>
           <a:p>
@@ -8283,23 +8326,23 @@
           <a:p>
             <a:r>
               <a:rPr lang="en-US" dirty="0"/>
-              <a:t>Our database team is geared to provide expansive information to the end-user at a small cost. </a:t>
+              <a:t>Our database team is driven to provide expansive information to the end-user at a small cost fee. </a:t>
             </a:r>
           </a:p>
           <a:p>
             <a:r>
               <a:rPr lang="en-US" dirty="0"/>
-              <a:t>We understand the meaning of reading/studying all the information about a game before it becomes released </a:t>
+              <a:t>We understand the logistics of reading/studying all the information about a game before it pre-releases </a:t>
             </a:r>
           </a:p>
           <a:p>
             <a:r>
               <a:rPr lang="en-US" dirty="0"/>
-              <a:t>This includes after the fact; This includes information about certain sound tracks, publishers, developers, </a:t>
+              <a:t>The database vaults; This includes information about original sound tracks, publishers, developers, </a:t>
             </a:r>
             <a:r>
               <a:rPr lang="en-US" dirty="0" err="1"/>
-              <a:t>etc</a:t>
+              <a:t>Etc</a:t>
             </a:r>
             <a:r>
               <a:rPr lang="en-US" dirty="0"/>
@@ -8309,7 +8352,7 @@
           <a:p>
             <a:r>
               <a:rPr lang="en-US" dirty="0"/>
-              <a:t>Creating a central hub allows ease of access to all those looking to read up on certain video games. </a:t>
+              <a:t>Developing a central hub that allows access to all users researching particular video games. </a:t>
             </a:r>
           </a:p>
         </p:txBody>
@@ -8904,10 +8947,10 @@
       </p:pic>
       <p:sp>
         <p:nvSpPr>
-          <p:cNvPr id="10" name="Content Placeholder 9">
+          <p:cNvPr id="6" name="Content Placeholder 5">
             <a:extLst>
               <a:ext uri="{FF2B5EF4-FFF2-40B4-BE49-F238E27FC236}">
-                <a16:creationId xmlns:a16="http://schemas.microsoft.com/office/drawing/2014/main" id="{0CFE66C5-4F6B-4826-B97C-C8A1336758CA}"/>
+                <a16:creationId xmlns:a16="http://schemas.microsoft.com/office/drawing/2014/main" id="{EE918146-8E9F-4F09-B4E5-5C679901BD78}"/>
               </a:ext>
             </a:extLst>
           </p:cNvPr>
@@ -8918,19 +8961,12 @@
             <p:ph idx="1"/>
           </p:nvPr>
         </p:nvSpPr>
-        <p:spPr>
-          <a:xfrm>
-            <a:off x="680322" y="2336873"/>
-            <a:ext cx="3581635" cy="3599316"/>
-          </a:xfrm>
-        </p:spPr>
-        <p:txBody>
-          <a:bodyPr>
-            <a:normAutofit/>
-          </a:bodyPr>
+        <p:spPr/>
+        <p:txBody>
+          <a:bodyPr/>
           <a:lstStyle/>
           <a:p>
-            <a:endParaRPr lang="en-US" sz="1600" dirty="0"/>
+            <a:endParaRPr lang="en-US"/>
           </a:p>
         </p:txBody>
       </p:sp>
@@ -9234,6 +9270,36 @@
           </a:p>
         </p:txBody>
       </p:sp>
+      <p:pic>
+        <p:nvPicPr>
+          <p:cNvPr id="5" name="Picture 4">
+            <a:extLst>
+              <a:ext uri="{FF2B5EF4-FFF2-40B4-BE49-F238E27FC236}">
+                <a16:creationId xmlns:a16="http://schemas.microsoft.com/office/drawing/2014/main" id="{C9353BDB-24D7-4C5E-B2C3-B24C026EE82B}"/>
+              </a:ext>
+            </a:extLst>
+          </p:cNvPr>
+          <p:cNvPicPr>
+            <a:picLocks noChangeAspect="1"/>
+          </p:cNvPicPr>
+          <p:nvPr/>
+        </p:nvPicPr>
+        <p:blipFill>
+          <a:blip r:embed="rId2"/>
+          <a:stretch>
+            <a:fillRect/>
+          </a:stretch>
+        </p:blipFill>
+        <p:spPr>
+          <a:xfrm>
+            <a:off x="6619631" y="3429000"/>
+            <a:ext cx="2543175" cy="1800225"/>
+          </a:xfrm>
+          <a:prstGeom prst="rect">
+            <a:avLst/>
+          </a:prstGeom>
+        </p:spPr>
+      </p:pic>
     </p:spTree>
     <p:extLst>
       <p:ext uri="{BB962C8B-B14F-4D97-AF65-F5344CB8AC3E}">
@@ -9664,42 +9730,6 @@
           </a:prstGeom>
         </p:spPr>
       </p:pic>
-      <p:sp>
-        <p:nvSpPr>
-          <p:cNvPr id="10" name="Content Placeholder 9">
-            <a:extLst>
-              <a:ext uri="{FF2B5EF4-FFF2-40B4-BE49-F238E27FC236}">
-                <a16:creationId xmlns:a16="http://schemas.microsoft.com/office/drawing/2014/main" id="{B21B31F9-F064-49AE-9B15-60057BC49374}"/>
-              </a:ext>
-            </a:extLst>
-          </p:cNvPr>
-          <p:cNvSpPr>
-            <a:spLocks noGrp="1"/>
-          </p:cNvSpPr>
-          <p:nvPr>
-            <p:ph idx="1"/>
-          </p:nvPr>
-        </p:nvSpPr>
-        <p:spPr>
-          <a:xfrm>
-            <a:off x="680321" y="2336873"/>
-            <a:ext cx="3656289" cy="3599316"/>
-          </a:xfrm>
-        </p:spPr>
-        <p:txBody>
-          <a:bodyPr>
-            <a:normAutofit/>
-          </a:bodyPr>
-          <a:lstStyle/>
-          <a:p>
-            <a:endParaRPr lang="en-US" sz="1400">
-              <a:solidFill>
-                <a:srgbClr val="FFFFFF"/>
-              </a:solidFill>
-            </a:endParaRPr>
-          </a:p>
-        </p:txBody>
-      </p:sp>
       <p:sp useBgFill="1">
         <p:nvSpPr>
           <p:cNvPr id="23" name="Rectangle 22">
@@ -9801,6 +9831,31 @@
           <a:effectLst/>
         </p:spPr>
       </p:pic>
+      <p:sp>
+        <p:nvSpPr>
+          <p:cNvPr id="6" name="Content Placeholder 5">
+            <a:extLst>
+              <a:ext uri="{FF2B5EF4-FFF2-40B4-BE49-F238E27FC236}">
+                <a16:creationId xmlns:a16="http://schemas.microsoft.com/office/drawing/2014/main" id="{F521FC3B-8824-49A5-8049-98982A012125}"/>
+              </a:ext>
+            </a:extLst>
+          </p:cNvPr>
+          <p:cNvSpPr>
+            <a:spLocks noGrp="1"/>
+          </p:cNvSpPr>
+          <p:nvPr>
+            <p:ph idx="1"/>
+          </p:nvPr>
+        </p:nvSpPr>
+        <p:spPr/>
+        <p:txBody>
+          <a:bodyPr/>
+          <a:lstStyle/>
+          <a:p>
+            <a:endParaRPr lang="en-US"/>
+          </a:p>
+        </p:txBody>
+      </p:sp>
     </p:spTree>
     <p:extLst>
       <p:ext uri="{BB962C8B-B14F-4D97-AF65-F5344CB8AC3E}">

</xml_diff>

<commit_message>
Final final edit of the powerpoint
</commit_message>
<xml_diff>
--- a/Project/Final_DATABASE/Game_Database_Project.pptx
+++ b/Project/Final_DATABASE/Game_Database_Project.pptx
@@ -8640,7 +8640,7 @@
       </p:grpSpPr>
       <p:grpSp>
         <p:nvGrpSpPr>
-          <p:cNvPr id="24" name="Group 23">
+          <p:cNvPr id="13" name="Group 12">
             <a:extLst>
               <a:ext uri="{FF2B5EF4-FFF2-40B4-BE49-F238E27FC236}">
                 <a16:creationId xmlns:a16="http://schemas.microsoft.com/office/drawing/2014/main" id="{905A9BAA-B344-45D2-838C-73856C4B15D4}"/>
@@ -8671,7 +8671,7 @@
         </p:grpSpPr>
         <p:sp useBgFill="1">
           <p:nvSpPr>
-            <p:cNvPr id="25" name="Rectangle 24">
+            <p:cNvPr id="14" name="Rectangle 13">
               <a:extLst>
                 <a:ext uri="{FF2B5EF4-FFF2-40B4-BE49-F238E27FC236}">
                   <a16:creationId xmlns:a16="http://schemas.microsoft.com/office/drawing/2014/main" id="{390434AA-4632-440E-9AE7-411396A779CA}"/>
@@ -8729,7 +8729,7 @@
         </p:sp>
         <p:pic>
           <p:nvPicPr>
-            <p:cNvPr id="26" name="Picture 25">
+            <p:cNvPr id="15" name="Picture 14">
               <a:extLst>
                 <a:ext uri="{FF2B5EF4-FFF2-40B4-BE49-F238E27FC236}">
                   <a16:creationId xmlns:a16="http://schemas.microsoft.com/office/drawing/2014/main" id="{D462FD1E-E713-4FD4-8746-671C946723BD}"/>
@@ -8774,42 +8774,9 @@
           </p:spPr>
         </p:pic>
       </p:grpSp>
-      <p:pic>
-        <p:nvPicPr>
-          <p:cNvPr id="3" name="Picture 2">
-            <a:extLst>
-              <a:ext uri="{FF2B5EF4-FFF2-40B4-BE49-F238E27FC236}">
-                <a16:creationId xmlns:a16="http://schemas.microsoft.com/office/drawing/2014/main" id="{C716D124-13FB-BA44-8BF0-5641331B938A}"/>
-              </a:ext>
-            </a:extLst>
-          </p:cNvPr>
-          <p:cNvPicPr>
-            <a:picLocks noChangeAspect="1"/>
-          </p:cNvPicPr>
-          <p:nvPr/>
-        </p:nvPicPr>
-        <p:blipFill rotWithShape="1">
-          <a:blip r:embed="rId3"/>
-          <a:srcRect t="1737" r="1" b="13159"/>
-          <a:stretch/>
-        </p:blipFill>
-        <p:spPr>
-          <a:xfrm>
-            <a:off x="4636008" y="10"/>
-            <a:ext cx="7552815" cy="6856310"/>
-          </a:xfrm>
-          <a:prstGeom prst="rect">
-            <a:avLst/>
-          </a:prstGeom>
-          <a:ln>
-            <a:noFill/>
-          </a:ln>
-          <a:effectLst/>
-        </p:spPr>
-      </p:pic>
-      <p:sp>
-        <p:nvSpPr>
-          <p:cNvPr id="28" name="Rectangle 27">
+      <p:sp>
+        <p:nvSpPr>
+          <p:cNvPr id="17" name="Rectangle 16">
             <a:extLst>
               <a:ext uri="{FF2B5EF4-FFF2-40B4-BE49-F238E27FC236}">
                 <a16:creationId xmlns:a16="http://schemas.microsoft.com/office/drawing/2014/main" id="{78A4CDE5-C7BC-41E1-8A4A-79E024CC09F3}"/>
@@ -8883,7 +8850,7 @@
         </p:nvSpPr>
         <p:spPr>
           <a:xfrm>
-            <a:off x="680322" y="753228"/>
+            <a:off x="582929" y="694122"/>
             <a:ext cx="3679028" cy="1080938"/>
           </a:xfrm>
         </p:spPr>
@@ -8902,7 +8869,7 @@
       </p:sp>
       <p:pic>
         <p:nvPicPr>
-          <p:cNvPr id="30" name="Picture 29">
+          <p:cNvPr id="19" name="Picture 18">
             <a:extLst>
               <a:ext uri="{FF2B5EF4-FFF2-40B4-BE49-F238E27FC236}">
                 <a16:creationId xmlns:a16="http://schemas.microsoft.com/office/drawing/2014/main" id="{025C7952-5703-489E-8DBD-F2EFAC8EEB05}"/>
@@ -8924,7 +8891,7 @@
           </p:nvPr>
         </p:nvPicPr>
         <p:blipFill>
-          <a:blip r:embed="rId4">
+          <a:blip r:embed="rId3">
             <a:extLst>
               <a:ext uri="{28A0092B-C50C-407E-A947-70E740481C1C}">
                 <a14:useLocalDpi xmlns:a14="http://schemas.microsoft.com/office/drawing/2010/main" val="0"/>
@@ -8963,20 +8930,48 @@
         </p:nvSpPr>
         <p:spPr>
           <a:xfrm>
-            <a:off x="680322" y="2336873"/>
-            <a:ext cx="3581635" cy="3599316"/>
-          </a:xfrm>
-        </p:spPr>
-        <p:txBody>
-          <a:bodyPr>
-            <a:normAutofit/>
-          </a:bodyPr>
+            <a:off x="680321" y="2336873"/>
+            <a:ext cx="9613861" cy="3599316"/>
+          </a:xfrm>
+        </p:spPr>
+        <p:txBody>
+          <a:bodyPr/>
           <a:lstStyle/>
           <a:p>
-            <a:endParaRPr lang="en-US" sz="1600"/>
-          </a:p>
-        </p:txBody>
-      </p:sp>
+            <a:endParaRPr lang="en-US" dirty="0"/>
+          </a:p>
+        </p:txBody>
+      </p:sp>
+      <p:pic>
+        <p:nvPicPr>
+          <p:cNvPr id="3" name="Picture 2">
+            <a:extLst>
+              <a:ext uri="{FF2B5EF4-FFF2-40B4-BE49-F238E27FC236}">
+                <a16:creationId xmlns:a16="http://schemas.microsoft.com/office/drawing/2014/main" id="{C716D124-13FB-BA44-8BF0-5641331B938A}"/>
+              </a:ext>
+            </a:extLst>
+          </p:cNvPr>
+          <p:cNvPicPr>
+            <a:picLocks noChangeAspect="1"/>
+          </p:cNvPicPr>
+          <p:nvPr/>
+        </p:nvPicPr>
+        <p:blipFill>
+          <a:blip r:embed="rId4"/>
+          <a:stretch>
+            <a:fillRect/>
+          </a:stretch>
+        </p:blipFill>
+        <p:spPr>
+          <a:xfrm>
+            <a:off x="5029202" y="6318"/>
+            <a:ext cx="7162797" cy="6823014"/>
+          </a:xfrm>
+          <a:prstGeom prst="rect">
+            <a:avLst/>
+          </a:prstGeom>
+        </p:spPr>
+      </p:pic>
     </p:spTree>
     <p:extLst>
       <p:ext uri="{BB962C8B-B14F-4D97-AF65-F5344CB8AC3E}">

</xml_diff>